<commit_message>
Update comments and presentation.
</commit_message>
<xml_diff>
--- a/Introduction to Python Splash Page.pptx
+++ b/Introduction to Python Splash Page.pptx
@@ -105,6 +105,11 @@
       </a:defRPr>
     </a:lvl9pPr>
   </p:defaultTextStyle>
+  <p:extLst>
+    <p:ext uri="{EFAFB233-063F-42B5-8137-9DF3F51BA10A}">
+      <p15:sldGuideLst xmlns:p15="http://schemas.microsoft.com/office/powerpoint/2012/main"/>
+    </p:ext>
+  </p:extLst>
 </p:presentation>
 </file>
 
@@ -3113,10 +3118,6 @@
             </a:r>
             <a:r>
               <a:rPr lang="en-US" sz="4000" dirty="0" smtClean="0"/>
-              <a:t> </a:t>
-            </a:r>
-            <a:r>
-              <a:rPr lang="en-US" sz="4000" dirty="0" smtClean="0"/>
               <a:t>workshop </a:t>
             </a:r>
             <a:r>
@@ -3153,7 +3154,6 @@
               <a:rPr lang="en-US" sz="4000" dirty="0"/>
               <a:t>https://github.com/mike-babb/intro_to_python</a:t>
             </a:r>
-            <a:endParaRPr lang="en-US" sz="4000" dirty="0"/>
           </a:p>
         </p:txBody>
       </p:sp>

</xml_diff>

<commit_message>
Updates to workshop slide deck and notebook.
</commit_message>
<xml_diff>
--- a/Introduction to Python Splash Page.pptx
+++ b/Introduction to Python Splash Page.pptx
@@ -244,7 +244,7 @@
           <a:p>
             <a:fld id="{652BE7AB-D5F9-450E-9CCB-F58AD65D0B70}" type="datetimeFigureOut">
               <a:rPr lang="en-US" smtClean="0"/>
-              <a:t>2/7/2019</a:t>
+              <a:t>4/10/2019</a:t>
             </a:fld>
             <a:endParaRPr lang="en-US"/>
           </a:p>
@@ -414,7 +414,7 @@
           <a:p>
             <a:fld id="{652BE7AB-D5F9-450E-9CCB-F58AD65D0B70}" type="datetimeFigureOut">
               <a:rPr lang="en-US" smtClean="0"/>
-              <a:t>2/7/2019</a:t>
+              <a:t>4/10/2019</a:t>
             </a:fld>
             <a:endParaRPr lang="en-US"/>
           </a:p>
@@ -594,7 +594,7 @@
           <a:p>
             <a:fld id="{652BE7AB-D5F9-450E-9CCB-F58AD65D0B70}" type="datetimeFigureOut">
               <a:rPr lang="en-US" smtClean="0"/>
-              <a:t>2/7/2019</a:t>
+              <a:t>4/10/2019</a:t>
             </a:fld>
             <a:endParaRPr lang="en-US"/>
           </a:p>
@@ -764,7 +764,7 @@
           <a:p>
             <a:fld id="{652BE7AB-D5F9-450E-9CCB-F58AD65D0B70}" type="datetimeFigureOut">
               <a:rPr lang="en-US" smtClean="0"/>
-              <a:t>2/7/2019</a:t>
+              <a:t>4/10/2019</a:t>
             </a:fld>
             <a:endParaRPr lang="en-US"/>
           </a:p>
@@ -1010,7 +1010,7 @@
           <a:p>
             <a:fld id="{652BE7AB-D5F9-450E-9CCB-F58AD65D0B70}" type="datetimeFigureOut">
               <a:rPr lang="en-US" smtClean="0"/>
-              <a:t>2/7/2019</a:t>
+              <a:t>4/10/2019</a:t>
             </a:fld>
             <a:endParaRPr lang="en-US"/>
           </a:p>
@@ -1242,7 +1242,7 @@
           <a:p>
             <a:fld id="{652BE7AB-D5F9-450E-9CCB-F58AD65D0B70}" type="datetimeFigureOut">
               <a:rPr lang="en-US" smtClean="0"/>
-              <a:t>2/7/2019</a:t>
+              <a:t>4/10/2019</a:t>
             </a:fld>
             <a:endParaRPr lang="en-US"/>
           </a:p>
@@ -1609,7 +1609,7 @@
           <a:p>
             <a:fld id="{652BE7AB-D5F9-450E-9CCB-F58AD65D0B70}" type="datetimeFigureOut">
               <a:rPr lang="en-US" smtClean="0"/>
-              <a:t>2/7/2019</a:t>
+              <a:t>4/10/2019</a:t>
             </a:fld>
             <a:endParaRPr lang="en-US"/>
           </a:p>
@@ -1727,7 +1727,7 @@
           <a:p>
             <a:fld id="{652BE7AB-D5F9-450E-9CCB-F58AD65D0B70}" type="datetimeFigureOut">
               <a:rPr lang="en-US" smtClean="0"/>
-              <a:t>2/7/2019</a:t>
+              <a:t>4/10/2019</a:t>
             </a:fld>
             <a:endParaRPr lang="en-US"/>
           </a:p>
@@ -1822,7 +1822,7 @@
           <a:p>
             <a:fld id="{652BE7AB-D5F9-450E-9CCB-F58AD65D0B70}" type="datetimeFigureOut">
               <a:rPr lang="en-US" smtClean="0"/>
-              <a:t>2/7/2019</a:t>
+              <a:t>4/10/2019</a:t>
             </a:fld>
             <a:endParaRPr lang="en-US"/>
           </a:p>
@@ -2099,7 +2099,7 @@
           <a:p>
             <a:fld id="{652BE7AB-D5F9-450E-9CCB-F58AD65D0B70}" type="datetimeFigureOut">
               <a:rPr lang="en-US" smtClean="0"/>
-              <a:t>2/7/2019</a:t>
+              <a:t>4/10/2019</a:t>
             </a:fld>
             <a:endParaRPr lang="en-US"/>
           </a:p>
@@ -2352,7 +2352,7 @@
           <a:p>
             <a:fld id="{652BE7AB-D5F9-450E-9CCB-F58AD65D0B70}" type="datetimeFigureOut">
               <a:rPr lang="en-US" smtClean="0"/>
-              <a:t>2/7/2019</a:t>
+              <a:t>4/10/2019</a:t>
             </a:fld>
             <a:endParaRPr lang="en-US"/>
           </a:p>
@@ -2565,7 +2565,7 @@
           <a:p>
             <a:fld id="{652BE7AB-D5F9-450E-9CCB-F58AD65D0B70}" type="datetimeFigureOut">
               <a:rPr lang="en-US" smtClean="0"/>
-              <a:t>2/7/2019</a:t>
+              <a:t>4/10/2019</a:t>
             </a:fld>
             <a:endParaRPr lang="en-US"/>
           </a:p>
@@ -3010,7 +3010,11 @@
           <a:p>
             <a:r>
               <a:rPr lang="en-US" dirty="0" smtClean="0"/>
-              <a:t>February 7, 2019</a:t>
+              <a:t>April 11, </a:t>
+            </a:r>
+            <a:r>
+              <a:rPr lang="en-US" dirty="0" smtClean="0"/>
+              <a:t>2019</a:t>
             </a:r>
           </a:p>
           <a:p>
@@ -3114,15 +3118,7 @@
           <a:p>
             <a:r>
               <a:rPr lang="en-US" sz="4000" dirty="0" smtClean="0"/>
-              <a:t>Location of this tutorial and </a:t>
-            </a:r>
-            <a:r>
-              <a:rPr lang="en-US" sz="4000" dirty="0" smtClean="0"/>
-              <a:t>workshop </a:t>
-            </a:r>
-            <a:r>
-              <a:rPr lang="en-US" sz="4000" dirty="0" smtClean="0"/>
-              <a:t>material</a:t>
+              <a:t>Location of this tutorial and workshop material</a:t>
             </a:r>
             <a:endParaRPr lang="en-US" sz="4000" dirty="0"/>
           </a:p>

</xml_diff>

<commit_message>
Updates to slide deck and jupyter notebook.
</commit_message>
<xml_diff>
--- a/Introduction to Python Splash Page.pptx
+++ b/Introduction to Python Splash Page.pptx
@@ -244,7 +244,7 @@
           <a:p>
             <a:fld id="{652BE7AB-D5F9-450E-9CCB-F58AD65D0B70}" type="datetimeFigureOut">
               <a:rPr lang="en-US" smtClean="0"/>
-              <a:t>4/10/2019</a:t>
+              <a:t>7/15/2019</a:t>
             </a:fld>
             <a:endParaRPr lang="en-US"/>
           </a:p>
@@ -414,7 +414,7 @@
           <a:p>
             <a:fld id="{652BE7AB-D5F9-450E-9CCB-F58AD65D0B70}" type="datetimeFigureOut">
               <a:rPr lang="en-US" smtClean="0"/>
-              <a:t>4/10/2019</a:t>
+              <a:t>7/15/2019</a:t>
             </a:fld>
             <a:endParaRPr lang="en-US"/>
           </a:p>
@@ -594,7 +594,7 @@
           <a:p>
             <a:fld id="{652BE7AB-D5F9-450E-9CCB-F58AD65D0B70}" type="datetimeFigureOut">
               <a:rPr lang="en-US" smtClean="0"/>
-              <a:t>4/10/2019</a:t>
+              <a:t>7/15/2019</a:t>
             </a:fld>
             <a:endParaRPr lang="en-US"/>
           </a:p>
@@ -764,7 +764,7 @@
           <a:p>
             <a:fld id="{652BE7AB-D5F9-450E-9CCB-F58AD65D0B70}" type="datetimeFigureOut">
               <a:rPr lang="en-US" smtClean="0"/>
-              <a:t>4/10/2019</a:t>
+              <a:t>7/15/2019</a:t>
             </a:fld>
             <a:endParaRPr lang="en-US"/>
           </a:p>
@@ -1010,7 +1010,7 @@
           <a:p>
             <a:fld id="{652BE7AB-D5F9-450E-9CCB-F58AD65D0B70}" type="datetimeFigureOut">
               <a:rPr lang="en-US" smtClean="0"/>
-              <a:t>4/10/2019</a:t>
+              <a:t>7/15/2019</a:t>
             </a:fld>
             <a:endParaRPr lang="en-US"/>
           </a:p>
@@ -1242,7 +1242,7 @@
           <a:p>
             <a:fld id="{652BE7AB-D5F9-450E-9CCB-F58AD65D0B70}" type="datetimeFigureOut">
               <a:rPr lang="en-US" smtClean="0"/>
-              <a:t>4/10/2019</a:t>
+              <a:t>7/15/2019</a:t>
             </a:fld>
             <a:endParaRPr lang="en-US"/>
           </a:p>
@@ -1609,7 +1609,7 @@
           <a:p>
             <a:fld id="{652BE7AB-D5F9-450E-9CCB-F58AD65D0B70}" type="datetimeFigureOut">
               <a:rPr lang="en-US" smtClean="0"/>
-              <a:t>4/10/2019</a:t>
+              <a:t>7/15/2019</a:t>
             </a:fld>
             <a:endParaRPr lang="en-US"/>
           </a:p>
@@ -1727,7 +1727,7 @@
           <a:p>
             <a:fld id="{652BE7AB-D5F9-450E-9CCB-F58AD65D0B70}" type="datetimeFigureOut">
               <a:rPr lang="en-US" smtClean="0"/>
-              <a:t>4/10/2019</a:t>
+              <a:t>7/15/2019</a:t>
             </a:fld>
             <a:endParaRPr lang="en-US"/>
           </a:p>
@@ -1822,7 +1822,7 @@
           <a:p>
             <a:fld id="{652BE7AB-D5F9-450E-9CCB-F58AD65D0B70}" type="datetimeFigureOut">
               <a:rPr lang="en-US" smtClean="0"/>
-              <a:t>4/10/2019</a:t>
+              <a:t>7/15/2019</a:t>
             </a:fld>
             <a:endParaRPr lang="en-US"/>
           </a:p>
@@ -2099,7 +2099,7 @@
           <a:p>
             <a:fld id="{652BE7AB-D5F9-450E-9CCB-F58AD65D0B70}" type="datetimeFigureOut">
               <a:rPr lang="en-US" smtClean="0"/>
-              <a:t>4/10/2019</a:t>
+              <a:t>7/15/2019</a:t>
             </a:fld>
             <a:endParaRPr lang="en-US"/>
           </a:p>
@@ -2352,7 +2352,7 @@
           <a:p>
             <a:fld id="{652BE7AB-D5F9-450E-9CCB-F58AD65D0B70}" type="datetimeFigureOut">
               <a:rPr lang="en-US" smtClean="0"/>
-              <a:t>4/10/2019</a:t>
+              <a:t>7/15/2019</a:t>
             </a:fld>
             <a:endParaRPr lang="en-US"/>
           </a:p>
@@ -2565,7 +2565,7 @@
           <a:p>
             <a:fld id="{652BE7AB-D5F9-450E-9CCB-F58AD65D0B70}" type="datetimeFigureOut">
               <a:rPr lang="en-US" smtClean="0"/>
-              <a:t>4/10/2019</a:t>
+              <a:t>7/15/2019</a:t>
             </a:fld>
             <a:endParaRPr lang="en-US"/>
           </a:p>
@@ -3005,12 +3005,14 @@
         </p:nvSpPr>
         <p:spPr/>
         <p:txBody>
-          <a:bodyPr/>
+          <a:bodyPr>
+            <a:normAutofit lnSpcReduction="10000"/>
+          </a:bodyPr>
           <a:lstStyle/>
           <a:p>
             <a:r>
               <a:rPr lang="en-US" dirty="0" smtClean="0"/>
-              <a:t>April 11, </a:t>
+              <a:t>July 15, </a:t>
             </a:r>
             <a:r>
               <a:rPr lang="en-US" dirty="0" smtClean="0"/>
@@ -3020,8 +3022,19 @@
           <a:p>
             <a:r>
               <a:rPr lang="en-US" dirty="0" smtClean="0"/>
-              <a:t>Mike Babb, Ph.C.</a:t>
-            </a:r>
+              <a:t>Mike Babb, Ph.C</a:t>
+            </a:r>
+            <a:r>
+              <a:rPr lang="en-US" dirty="0" smtClean="0"/>
+              <a:t>.</a:t>
+            </a:r>
+          </a:p>
+          <a:p>
+            <a:r>
+              <a:rPr lang="en-US" dirty="0" smtClean="0"/>
+              <a:t>Center for Social Science Computation and Research</a:t>
+            </a:r>
+            <a:endParaRPr lang="en-US" dirty="0" smtClean="0"/>
           </a:p>
           <a:p>
             <a:r>

</xml_diff>

<commit_message>
Updates to the tutorial notebook.
</commit_message>
<xml_diff>
--- a/Introduction to Python Splash Page.pptx
+++ b/Introduction to Python Splash Page.pptx
@@ -244,7 +244,7 @@
           <a:p>
             <a:fld id="{652BE7AB-D5F9-450E-9CCB-F58AD65D0B70}" type="datetimeFigureOut">
               <a:rPr lang="en-US" smtClean="0"/>
-              <a:t>7/15/2019</a:t>
+              <a:t>9/9/2019</a:t>
             </a:fld>
             <a:endParaRPr lang="en-US"/>
           </a:p>
@@ -414,7 +414,7 @@
           <a:p>
             <a:fld id="{652BE7AB-D5F9-450E-9CCB-F58AD65D0B70}" type="datetimeFigureOut">
               <a:rPr lang="en-US" smtClean="0"/>
-              <a:t>7/15/2019</a:t>
+              <a:t>9/9/2019</a:t>
             </a:fld>
             <a:endParaRPr lang="en-US"/>
           </a:p>
@@ -594,7 +594,7 @@
           <a:p>
             <a:fld id="{652BE7AB-D5F9-450E-9CCB-F58AD65D0B70}" type="datetimeFigureOut">
               <a:rPr lang="en-US" smtClean="0"/>
-              <a:t>7/15/2019</a:t>
+              <a:t>9/9/2019</a:t>
             </a:fld>
             <a:endParaRPr lang="en-US"/>
           </a:p>
@@ -764,7 +764,7 @@
           <a:p>
             <a:fld id="{652BE7AB-D5F9-450E-9CCB-F58AD65D0B70}" type="datetimeFigureOut">
               <a:rPr lang="en-US" smtClean="0"/>
-              <a:t>7/15/2019</a:t>
+              <a:t>9/9/2019</a:t>
             </a:fld>
             <a:endParaRPr lang="en-US"/>
           </a:p>
@@ -1010,7 +1010,7 @@
           <a:p>
             <a:fld id="{652BE7AB-D5F9-450E-9CCB-F58AD65D0B70}" type="datetimeFigureOut">
               <a:rPr lang="en-US" smtClean="0"/>
-              <a:t>7/15/2019</a:t>
+              <a:t>9/9/2019</a:t>
             </a:fld>
             <a:endParaRPr lang="en-US"/>
           </a:p>
@@ -1242,7 +1242,7 @@
           <a:p>
             <a:fld id="{652BE7AB-D5F9-450E-9CCB-F58AD65D0B70}" type="datetimeFigureOut">
               <a:rPr lang="en-US" smtClean="0"/>
-              <a:t>7/15/2019</a:t>
+              <a:t>9/9/2019</a:t>
             </a:fld>
             <a:endParaRPr lang="en-US"/>
           </a:p>
@@ -1609,7 +1609,7 @@
           <a:p>
             <a:fld id="{652BE7AB-D5F9-450E-9CCB-F58AD65D0B70}" type="datetimeFigureOut">
               <a:rPr lang="en-US" smtClean="0"/>
-              <a:t>7/15/2019</a:t>
+              <a:t>9/9/2019</a:t>
             </a:fld>
             <a:endParaRPr lang="en-US"/>
           </a:p>
@@ -1727,7 +1727,7 @@
           <a:p>
             <a:fld id="{652BE7AB-D5F9-450E-9CCB-F58AD65D0B70}" type="datetimeFigureOut">
               <a:rPr lang="en-US" smtClean="0"/>
-              <a:t>7/15/2019</a:t>
+              <a:t>9/9/2019</a:t>
             </a:fld>
             <a:endParaRPr lang="en-US"/>
           </a:p>
@@ -1822,7 +1822,7 @@
           <a:p>
             <a:fld id="{652BE7AB-D5F9-450E-9CCB-F58AD65D0B70}" type="datetimeFigureOut">
               <a:rPr lang="en-US" smtClean="0"/>
-              <a:t>7/15/2019</a:t>
+              <a:t>9/9/2019</a:t>
             </a:fld>
             <a:endParaRPr lang="en-US"/>
           </a:p>
@@ -2099,7 +2099,7 @@
           <a:p>
             <a:fld id="{652BE7AB-D5F9-450E-9CCB-F58AD65D0B70}" type="datetimeFigureOut">
               <a:rPr lang="en-US" smtClean="0"/>
-              <a:t>7/15/2019</a:t>
+              <a:t>9/9/2019</a:t>
             </a:fld>
             <a:endParaRPr lang="en-US"/>
           </a:p>
@@ -2352,7 +2352,7 @@
           <a:p>
             <a:fld id="{652BE7AB-D5F9-450E-9CCB-F58AD65D0B70}" type="datetimeFigureOut">
               <a:rPr lang="en-US" smtClean="0"/>
-              <a:t>7/15/2019</a:t>
+              <a:t>9/9/2019</a:t>
             </a:fld>
             <a:endParaRPr lang="en-US"/>
           </a:p>
@@ -2565,7 +2565,7 @@
           <a:p>
             <a:fld id="{652BE7AB-D5F9-450E-9CCB-F58AD65D0B70}" type="datetimeFigureOut">
               <a:rPr lang="en-US" smtClean="0"/>
-              <a:t>7/15/2019</a:t>
+              <a:t>9/9/2019</a:t>
             </a:fld>
             <a:endParaRPr lang="en-US"/>
           </a:p>
@@ -3012,7 +3012,7 @@
           <a:p>
             <a:r>
               <a:rPr lang="en-US" dirty="0" smtClean="0"/>
-              <a:t>July 15, </a:t>
+              <a:t>September 9, </a:t>
             </a:r>
             <a:r>
               <a:rPr lang="en-US" dirty="0" smtClean="0"/>
@@ -3022,11 +3022,7 @@
           <a:p>
             <a:r>
               <a:rPr lang="en-US" dirty="0" smtClean="0"/>
-              <a:t>Mike Babb, Ph.C</a:t>
-            </a:r>
-            <a:r>
-              <a:rPr lang="en-US" dirty="0" smtClean="0"/>
-              <a:t>.</a:t>
+              <a:t>Mike Babb, Ph.C.</a:t>
             </a:r>
           </a:p>
           <a:p>
@@ -3034,7 +3030,6 @@
               <a:rPr lang="en-US" dirty="0" smtClean="0"/>
               <a:t>Center for Social Science Computation and Research</a:t>
             </a:r>
-            <a:endParaRPr lang="en-US" dirty="0" smtClean="0"/>
           </a:p>
           <a:p>
             <a:r>

</xml_diff>